<commit_message>
Design and analysis #1
</commit_message>
<xml_diff>
--- a/plan/SmartAdmin.pptx
+++ b/plan/SmartAdmin.pptx
@@ -14,8 +14,9 @@
     <p:sldId id="262" r:id="rId8"/>
     <p:sldId id="263" r:id="rId9"/>
     <p:sldId id="264" r:id="rId10"/>
-    <p:sldId id="265" r:id="rId11"/>
-    <p:sldId id="266" r:id="rId12"/>
+    <p:sldId id="267" r:id="rId11"/>
+    <p:sldId id="265" r:id="rId12"/>
+    <p:sldId id="266" r:id="rId13"/>
   </p:sldIdLst>
   <p:sldSz cx="9144000" cy="6858000" type="screen4x3"/>
   <p:notesSz cx="6858000" cy="9144000"/>
@@ -290,7 +291,8 @@
           <a:p>
             <a:fld id="{A87FC1D8-C076-4088-B787-9FAC5665D0DE}" type="datetimeFigureOut">
               <a:rPr lang="en-US" smtClean="0"/>
-              <a:t>11/9/2014</a:t>
+              <a:pPr/>
+              <a:t>11/11/2014</a:t>
             </a:fld>
             <a:endParaRPr lang="en-US"/>
           </a:p>
@@ -332,6 +334,7 @@
           <a:p>
             <a:fld id="{CD38FAEE-9D4B-4DA5-90F4-B1F985501B89}" type="slidenum">
               <a:rPr lang="en-US" smtClean="0"/>
+              <a:pPr/>
               <a:t>‹#›</a:t>
             </a:fld>
             <a:endParaRPr lang="en-US"/>
@@ -455,7 +458,8 @@
           <a:p>
             <a:fld id="{A87FC1D8-C076-4088-B787-9FAC5665D0DE}" type="datetimeFigureOut">
               <a:rPr lang="en-US" smtClean="0"/>
-              <a:t>11/9/2014</a:t>
+              <a:pPr/>
+              <a:t>11/11/2014</a:t>
             </a:fld>
             <a:endParaRPr lang="en-US"/>
           </a:p>
@@ -497,6 +501,7 @@
           <a:p>
             <a:fld id="{CD38FAEE-9D4B-4DA5-90F4-B1F985501B89}" type="slidenum">
               <a:rPr lang="en-US" smtClean="0"/>
+              <a:pPr/>
               <a:t>‹#›</a:t>
             </a:fld>
             <a:endParaRPr lang="en-US"/>
@@ -630,7 +635,8 @@
           <a:p>
             <a:fld id="{A87FC1D8-C076-4088-B787-9FAC5665D0DE}" type="datetimeFigureOut">
               <a:rPr lang="en-US" smtClean="0"/>
-              <a:t>11/9/2014</a:t>
+              <a:pPr/>
+              <a:t>11/11/2014</a:t>
             </a:fld>
             <a:endParaRPr lang="en-US"/>
           </a:p>
@@ -672,6 +678,7 @@
           <a:p>
             <a:fld id="{CD38FAEE-9D4B-4DA5-90F4-B1F985501B89}" type="slidenum">
               <a:rPr lang="en-US" smtClean="0"/>
+              <a:pPr/>
               <a:t>‹#›</a:t>
             </a:fld>
             <a:endParaRPr lang="en-US"/>
@@ -795,7 +802,8 @@
           <a:p>
             <a:fld id="{A87FC1D8-C076-4088-B787-9FAC5665D0DE}" type="datetimeFigureOut">
               <a:rPr lang="en-US" smtClean="0"/>
-              <a:t>11/9/2014</a:t>
+              <a:pPr/>
+              <a:t>11/11/2014</a:t>
             </a:fld>
             <a:endParaRPr lang="en-US"/>
           </a:p>
@@ -837,6 +845,7 @@
           <a:p>
             <a:fld id="{CD38FAEE-9D4B-4DA5-90F4-B1F985501B89}" type="slidenum">
               <a:rPr lang="en-US" smtClean="0"/>
+              <a:pPr/>
               <a:t>‹#›</a:t>
             </a:fld>
             <a:endParaRPr lang="en-US"/>
@@ -1037,7 +1046,8 @@
           <a:p>
             <a:fld id="{A87FC1D8-C076-4088-B787-9FAC5665D0DE}" type="datetimeFigureOut">
               <a:rPr lang="en-US" smtClean="0"/>
-              <a:t>11/9/2014</a:t>
+              <a:pPr/>
+              <a:t>11/11/2014</a:t>
             </a:fld>
             <a:endParaRPr lang="en-US"/>
           </a:p>
@@ -1079,6 +1089,7 @@
           <a:p>
             <a:fld id="{CD38FAEE-9D4B-4DA5-90F4-B1F985501B89}" type="slidenum">
               <a:rPr lang="en-US" smtClean="0"/>
+              <a:pPr/>
               <a:t>‹#›</a:t>
             </a:fld>
             <a:endParaRPr lang="en-US"/>
@@ -1301,7 +1312,8 @@
           <a:p>
             <a:fld id="{A87FC1D8-C076-4088-B787-9FAC5665D0DE}" type="datetimeFigureOut">
               <a:rPr lang="en-US" smtClean="0"/>
-              <a:t>11/9/2014</a:t>
+              <a:pPr/>
+              <a:t>11/11/2014</a:t>
             </a:fld>
             <a:endParaRPr lang="en-US"/>
           </a:p>
@@ -1343,6 +1355,7 @@
           <a:p>
             <a:fld id="{CD38FAEE-9D4B-4DA5-90F4-B1F985501B89}" type="slidenum">
               <a:rPr lang="en-US" smtClean="0"/>
+              <a:pPr/>
               <a:t>‹#›</a:t>
             </a:fld>
             <a:endParaRPr lang="en-US"/>
@@ -1679,7 +1692,8 @@
           <a:p>
             <a:fld id="{A87FC1D8-C076-4088-B787-9FAC5665D0DE}" type="datetimeFigureOut">
               <a:rPr lang="en-US" smtClean="0"/>
-              <a:t>11/9/2014</a:t>
+              <a:pPr/>
+              <a:t>11/11/2014</a:t>
             </a:fld>
             <a:endParaRPr lang="en-US"/>
           </a:p>
@@ -1721,6 +1735,7 @@
           <a:p>
             <a:fld id="{CD38FAEE-9D4B-4DA5-90F4-B1F985501B89}" type="slidenum">
               <a:rPr lang="en-US" smtClean="0"/>
+              <a:pPr/>
               <a:t>‹#›</a:t>
             </a:fld>
             <a:endParaRPr lang="en-US"/>
@@ -1829,7 +1844,8 @@
           <a:p>
             <a:fld id="{A87FC1D8-C076-4088-B787-9FAC5665D0DE}" type="datetimeFigureOut">
               <a:rPr lang="en-US" smtClean="0"/>
-              <a:t>11/9/2014</a:t>
+              <a:pPr/>
+              <a:t>11/11/2014</a:t>
             </a:fld>
             <a:endParaRPr lang="en-US"/>
           </a:p>
@@ -1871,6 +1887,7 @@
           <a:p>
             <a:fld id="{CD38FAEE-9D4B-4DA5-90F4-B1F985501B89}" type="slidenum">
               <a:rPr lang="en-US" smtClean="0"/>
+              <a:pPr/>
               <a:t>‹#›</a:t>
             </a:fld>
             <a:endParaRPr lang="en-US"/>
@@ -1919,7 +1936,8 @@
           <a:p>
             <a:fld id="{A87FC1D8-C076-4088-B787-9FAC5665D0DE}" type="datetimeFigureOut">
               <a:rPr lang="en-US" smtClean="0"/>
-              <a:t>11/9/2014</a:t>
+              <a:pPr/>
+              <a:t>11/11/2014</a:t>
             </a:fld>
             <a:endParaRPr lang="en-US"/>
           </a:p>
@@ -1961,6 +1979,7 @@
           <a:p>
             <a:fld id="{CD38FAEE-9D4B-4DA5-90F4-B1F985501B89}" type="slidenum">
               <a:rPr lang="en-US" smtClean="0"/>
+              <a:pPr/>
               <a:t>‹#›</a:t>
             </a:fld>
             <a:endParaRPr lang="en-US"/>
@@ -2180,7 +2199,8 @@
           <a:p>
             <a:fld id="{A87FC1D8-C076-4088-B787-9FAC5665D0DE}" type="datetimeFigureOut">
               <a:rPr lang="en-US" smtClean="0"/>
-              <a:t>11/9/2014</a:t>
+              <a:pPr/>
+              <a:t>11/11/2014</a:t>
             </a:fld>
             <a:endParaRPr lang="en-US"/>
           </a:p>
@@ -2222,6 +2242,7 @@
           <a:p>
             <a:fld id="{CD38FAEE-9D4B-4DA5-90F4-B1F985501B89}" type="slidenum">
               <a:rPr lang="en-US" smtClean="0"/>
+              <a:pPr/>
               <a:t>‹#›</a:t>
             </a:fld>
             <a:endParaRPr lang="en-US"/>
@@ -2468,7 +2489,8 @@
           <a:p>
             <a:fld id="{A87FC1D8-C076-4088-B787-9FAC5665D0DE}" type="datetimeFigureOut">
               <a:rPr lang="en-US" smtClean="0"/>
-              <a:t>11/9/2014</a:t>
+              <a:pPr/>
+              <a:t>11/11/2014</a:t>
             </a:fld>
             <a:endParaRPr lang="en-US"/>
           </a:p>
@@ -2515,6 +2537,7 @@
           <a:p>
             <a:fld id="{CD38FAEE-9D4B-4DA5-90F4-B1F985501B89}" type="slidenum">
               <a:rPr lang="en-US" smtClean="0"/>
+              <a:pPr/>
               <a:t>‹#›</a:t>
             </a:fld>
             <a:endParaRPr lang="en-US"/>
@@ -3239,7 +3262,8 @@
           <a:p>
             <a:fld id="{A87FC1D8-C076-4088-B787-9FAC5665D0DE}" type="datetimeFigureOut">
               <a:rPr lang="en-US" smtClean="0"/>
-              <a:t>11/9/2014</a:t>
+              <a:pPr/>
+              <a:t>11/11/2014</a:t>
             </a:fld>
             <a:endParaRPr lang="en-US"/>
           </a:p>
@@ -3317,6 +3341,7 @@
           <a:p>
             <a:fld id="{CD38FAEE-9D4B-4DA5-90F4-B1F985501B89}" type="slidenum">
               <a:rPr lang="en-US" smtClean="0"/>
+              <a:pPr/>
               <a:t>‹#›</a:t>
             </a:fld>
             <a:endParaRPr lang="en-US"/>
@@ -3978,8 +4003,20 @@
           <a:lstStyle/>
           <a:p>
             <a:r>
-              <a:rPr lang="ro-RO" dirty="0" smtClean="0"/>
-              <a:t>UI Mockup</a:t>
+              <a:rPr lang="en-US" dirty="0" err="1" smtClean="0"/>
+              <a:t>Alte</a:t>
+            </a:r>
+            <a:r>
+              <a:rPr lang="en-US" dirty="0" smtClean="0"/>
+              <a:t> feature-</a:t>
+            </a:r>
+            <a:r>
+              <a:rPr lang="en-US" dirty="0" err="1" smtClean="0"/>
+              <a:t>uri</a:t>
+            </a:r>
+            <a:r>
+              <a:rPr lang="en-US" dirty="0" smtClean="0"/>
+              <a:t> utile</a:t>
             </a:r>
             <a:endParaRPr lang="en-US" dirty="0"/>
           </a:p>
@@ -4001,18 +4038,10 @@
           <a:lstStyle/>
           <a:p>
             <a:r>
-              <a:rPr lang="ro-RO" b="1" dirty="0" smtClean="0">
-                <a:solidFill>
-                  <a:srgbClr val="FF0000"/>
-                </a:solidFill>
-              </a:rPr>
-              <a:t>UI Mockup goes here</a:t>
-            </a:r>
-            <a:endParaRPr lang="en-US" b="1" dirty="0">
-              <a:solidFill>
-                <a:srgbClr val="FF0000"/>
-              </a:solidFill>
-            </a:endParaRPr>
+              <a:rPr lang="en-US" dirty="0" err="1" smtClean="0"/>
+              <a:t>Statistici</a:t>
+            </a:r>
+            <a:endParaRPr lang="en-US" dirty="0"/>
           </a:p>
         </p:txBody>
       </p:sp>
@@ -4063,6 +4092,79 @@
           <a:bodyPr/>
           <a:lstStyle/>
           <a:p>
+            <a:r>
+              <a:rPr lang="ro-RO" dirty="0" smtClean="0"/>
+              <a:t>UI Mockup</a:t>
+            </a:r>
+            <a:endParaRPr lang="en-US" dirty="0"/>
+          </a:p>
+        </p:txBody>
+      </p:sp>
+      <p:pic>
+        <p:nvPicPr>
+          <p:cNvPr id="4" name="Content Placeholder 3" descr="SADUIMockup.png"/>
+          <p:cNvPicPr>
+            <a:picLocks noGrp="1" noChangeAspect="1"/>
+          </p:cNvPicPr>
+          <p:nvPr>
+            <p:ph idx="1"/>
+          </p:nvPr>
+        </p:nvPicPr>
+        <p:blipFill>
+          <a:blip r:embed="rId2"/>
+          <a:stretch>
+            <a:fillRect/>
+          </a:stretch>
+        </p:blipFill>
+        <p:spPr/>
+      </p:pic>
+    </p:spTree>
+  </p:cSld>
+  <p:clrMapOvr>
+    <a:masterClrMapping/>
+  </p:clrMapOvr>
+  <p:timing>
+    <p:tnLst>
+      <p:par>
+        <p:cTn id="1" dur="indefinite" restart="never" nodeType="tmRoot"/>
+      </p:par>
+    </p:tnLst>
+  </p:timing>
+</p:sld>
+</file>
+
+<file path=ppt/slides/slide12.xml><?xml version="1.0" encoding="utf-8"?>
+<p:sld xmlns:a="http://schemas.openxmlformats.org/drawingml/2006/main" xmlns:r="http://schemas.openxmlformats.org/officeDocument/2006/relationships" xmlns:p="http://schemas.openxmlformats.org/presentationml/2006/main">
+  <p:cSld>
+    <p:spTree>
+      <p:nvGrpSpPr>
+        <p:cNvPr id="1" name=""/>
+        <p:cNvGrpSpPr/>
+        <p:nvPr/>
+      </p:nvGrpSpPr>
+      <p:grpSpPr>
+        <a:xfrm>
+          <a:off x="0" y="0"/>
+          <a:ext cx="0" cy="0"/>
+          <a:chOff x="0" y="0"/>
+          <a:chExt cx="0" cy="0"/>
+        </a:xfrm>
+      </p:grpSpPr>
+      <p:sp>
+        <p:nvSpPr>
+          <p:cNvPr id="2" name="Title 1"/>
+          <p:cNvSpPr>
+            <a:spLocks noGrp="1"/>
+          </p:cNvSpPr>
+          <p:nvPr>
+            <p:ph type="title"/>
+          </p:nvPr>
+        </p:nvSpPr>
+        <p:spPr/>
+        <p:txBody>
+          <a:bodyPr/>
+          <a:lstStyle/>
+          <a:p>
             <a:endParaRPr lang="en-US" dirty="0"/>
           </a:p>
         </p:txBody>
@@ -4317,7 +4419,6 @@
               <a:rPr lang="ro-RO" sz="2800" dirty="0" smtClean="0"/>
               <a:t>Solutia propusa:</a:t>
             </a:r>
-            <a:endParaRPr lang="ro-RO" sz="2800" dirty="0" smtClean="0"/>
           </a:p>
           <a:p>
             <a:pPr lvl="1"/>
@@ -4861,16 +4962,19 @@
               <a:rPr lang="en-US" dirty="0" smtClean="0"/>
               <a:t>}/</a:t>
             </a:r>
-          </a:p>
-          <a:p>
             <a:endParaRPr lang="en-US" dirty="0" smtClean="0"/>
           </a:p>
           <a:p>
             <a:pPr lvl="1"/>
             <a:r>
               <a:rPr lang="en-US" dirty="0" smtClean="0"/>
-              <a:t>Ex:  {package} – maven</a:t>
-            </a:r>
+              <a:t>Ex:  {package} – </a:t>
+            </a:r>
+            <a:r>
+              <a:rPr lang="en-US" dirty="0" smtClean="0"/>
+              <a:t>Maven</a:t>
+            </a:r>
+            <a:endParaRPr lang="en-US" dirty="0" smtClean="0"/>
           </a:p>
           <a:p>
             <a:pPr lvl="1">
@@ -4895,12 +4999,13 @@
             </a:pPr>
             <a:r>
               <a:rPr lang="en-US" dirty="0" smtClean="0"/>
-              <a:t> </a:t>
+              <a:t>           {OS} – </a:t>
             </a:r>
             <a:r>
               <a:rPr lang="en-US" dirty="0" smtClean="0"/>
-              <a:t>          {OS} – windows</a:t>
-            </a:r>
+              <a:t>Windows</a:t>
+            </a:r>
+            <a:endParaRPr lang="en-US" dirty="0" smtClean="0"/>
           </a:p>
           <a:p>
             <a:pPr lvl="1">
@@ -4908,11 +5013,7 @@
             </a:pPr>
             <a:r>
               <a:rPr lang="en-US" dirty="0" smtClean="0"/>
-              <a:t> </a:t>
-            </a:r>
-            <a:r>
-              <a:rPr lang="en-US" dirty="0" smtClean="0"/>
-              <a:t>          {</a:t>
+              <a:t>           {</a:t>
             </a:r>
             <a:r>
               <a:rPr lang="en-US" dirty="0" err="1" smtClean="0"/>
@@ -4929,11 +5030,7 @@
             </a:pPr>
             <a:r>
               <a:rPr lang="en-US" dirty="0" smtClean="0"/>
-              <a:t> </a:t>
-            </a:r>
-            <a:r>
-              <a:rPr lang="en-US" dirty="0" smtClean="0"/>
-              <a:t>          {</a:t>
+              <a:t>           {</a:t>
             </a:r>
             <a:r>
               <a:rPr lang="en-US" dirty="0" err="1" smtClean="0"/>
@@ -4941,18 +5038,18 @@
             </a:r>
             <a:r>
               <a:rPr lang="en-US" dirty="0" smtClean="0"/>
-              <a:t>} – x64/x86</a:t>
-            </a:r>
-            <a:endParaRPr lang="ro-RO" dirty="0" smtClean="0"/>
+              <a:t>} – </a:t>
+            </a:r>
+            <a:r>
+              <a:rPr lang="en-US" dirty="0" smtClean="0"/>
+              <a:t>x64/x86</a:t>
+            </a:r>
           </a:p>
           <a:p>
             <a:pPr lvl="1">
               <a:buNone/>
             </a:pPr>
-            <a:r>
-              <a:rPr lang="ro-RO" dirty="0" smtClean="0"/>
-              <a:t>Alte exemple de metode:</a:t>
-            </a:r>
+            <a:endParaRPr lang="ro-RO" dirty="0" smtClean="0"/>
           </a:p>
           <a:p>
             <a:pPr lvl="1">
@@ -4960,11 +5057,36 @@
             </a:pPr>
             <a:r>
               <a:rPr lang="ro-RO" dirty="0" smtClean="0"/>
-              <a:t>a</a:t>
-            </a:r>
+              <a:t>Alte exemple de metode:</a:t>
+            </a:r>
+          </a:p>
+          <a:p>
+            <a:pPr lvl="1">
+              <a:buNone/>
+            </a:pPr>
             <a:r>
               <a:rPr lang="ro-RO" dirty="0" smtClean="0"/>
-              <a:t>vailablePackages/ , availableOSes/ , etc.</a:t>
+              <a:t>availablePackages</a:t>
+            </a:r>
+            <a:r>
+              <a:rPr lang="en-US" dirty="0" err="1" smtClean="0"/>
+              <a:t>AndVersions</a:t>
+            </a:r>
+            <a:r>
+              <a:rPr lang="ro-RO" dirty="0" smtClean="0"/>
+              <a:t>/ </a:t>
+            </a:r>
+            <a:r>
+              <a:rPr lang="ro-RO" dirty="0" smtClean="0"/>
+              <a:t>, </a:t>
+            </a:r>
+            <a:r>
+              <a:rPr lang="ro-RO" dirty="0" smtClean="0"/>
+              <a:t>availableOSes/ </a:t>
+            </a:r>
+            <a:r>
+              <a:rPr lang="ro-RO" dirty="0" smtClean="0"/>
+              <a:t>, etc.</a:t>
             </a:r>
             <a:endParaRPr lang="en-US" dirty="0" smtClean="0"/>
           </a:p>

</xml_diff>